<commit_message>
formatted and structured results notebook
</commit_message>
<xml_diff>
--- a/AI Project Presentation and Demo.pptx
+++ b/AI Project Presentation and Demo.pptx
@@ -239,7 +239,7 @@
           <a:p>
             <a:fld id="{53314C28-0889-394B-A727-728EAEFDACC1}" type="datetimeFigureOut">
               <a:rPr lang="en-US" smtClean="0"/>
-              <a:t>12/1/25</a:t>
+              <a:t>12/6/25</a:t>
             </a:fld>
             <a:endParaRPr lang="en-US"/>
           </a:p>
@@ -770,7 +770,7 @@
             <a:fld id="{1D8BD707-D9CF-40AE-B4C6-C98DA3205C09}" type="datetimeFigureOut">
               <a:rPr lang="en-US" smtClean="0"/>
               <a:pPr/>
-              <a:t>12/1/25</a:t>
+              <a:t>12/6/25</a:t>
             </a:fld>
             <a:endParaRPr lang="en-US"/>
           </a:p>
@@ -935,7 +935,7 @@
             <a:fld id="{1D8BD707-D9CF-40AE-B4C6-C98DA3205C09}" type="datetimeFigureOut">
               <a:rPr lang="en-US" smtClean="0"/>
               <a:pPr/>
-              <a:t>12/1/25</a:t>
+              <a:t>12/6/25</a:t>
             </a:fld>
             <a:endParaRPr lang="en-US"/>
           </a:p>
@@ -1110,7 +1110,7 @@
             <a:fld id="{1D8BD707-D9CF-40AE-B4C6-C98DA3205C09}" type="datetimeFigureOut">
               <a:rPr lang="en-US" smtClean="0"/>
               <a:pPr/>
-              <a:t>12/1/25</a:t>
+              <a:t>12/6/25</a:t>
             </a:fld>
             <a:endParaRPr lang="en-US"/>
           </a:p>
@@ -1275,7 +1275,7 @@
             <a:fld id="{1D8BD707-D9CF-40AE-B4C6-C98DA3205C09}" type="datetimeFigureOut">
               <a:rPr lang="en-US" smtClean="0"/>
               <a:pPr/>
-              <a:t>12/1/25</a:t>
+              <a:t>12/6/25</a:t>
             </a:fld>
             <a:endParaRPr lang="en-US"/>
           </a:p>
@@ -1517,7 +1517,7 @@
             <a:fld id="{1D8BD707-D9CF-40AE-B4C6-C98DA3205C09}" type="datetimeFigureOut">
               <a:rPr lang="en-US" smtClean="0"/>
               <a:pPr/>
-              <a:t>12/1/25</a:t>
+              <a:t>12/6/25</a:t>
             </a:fld>
             <a:endParaRPr lang="en-US"/>
           </a:p>
@@ -1799,7 +1799,7 @@
             <a:fld id="{1D8BD707-D9CF-40AE-B4C6-C98DA3205C09}" type="datetimeFigureOut">
               <a:rPr lang="en-US" smtClean="0"/>
               <a:pPr/>
-              <a:t>12/1/25</a:t>
+              <a:t>12/6/25</a:t>
             </a:fld>
             <a:endParaRPr lang="en-US"/>
           </a:p>
@@ -2215,7 +2215,7 @@
             <a:fld id="{1D8BD707-D9CF-40AE-B4C6-C98DA3205C09}" type="datetimeFigureOut">
               <a:rPr lang="en-US" smtClean="0"/>
               <a:pPr/>
-              <a:t>12/1/25</a:t>
+              <a:t>12/6/25</a:t>
             </a:fld>
             <a:endParaRPr lang="en-US"/>
           </a:p>
@@ -2329,7 +2329,7 @@
             <a:fld id="{1D8BD707-D9CF-40AE-B4C6-C98DA3205C09}" type="datetimeFigureOut">
               <a:rPr lang="en-US" smtClean="0"/>
               <a:pPr/>
-              <a:t>12/1/25</a:t>
+              <a:t>12/6/25</a:t>
             </a:fld>
             <a:endParaRPr lang="en-US"/>
           </a:p>
@@ -2421,7 +2421,7 @@
             <a:fld id="{1D8BD707-D9CF-40AE-B4C6-C98DA3205C09}" type="datetimeFigureOut">
               <a:rPr lang="en-US" smtClean="0"/>
               <a:pPr/>
-              <a:t>12/1/25</a:t>
+              <a:t>12/6/25</a:t>
             </a:fld>
             <a:endParaRPr lang="en-US"/>
           </a:p>
@@ -2693,7 +2693,7 @@
             <a:fld id="{1D8BD707-D9CF-40AE-B4C6-C98DA3205C09}" type="datetimeFigureOut">
               <a:rPr lang="en-US" smtClean="0"/>
               <a:pPr/>
-              <a:t>12/1/25</a:t>
+              <a:t>12/6/25</a:t>
             </a:fld>
             <a:endParaRPr lang="en-US"/>
           </a:p>
@@ -2942,7 +2942,7 @@
             <a:fld id="{1D8BD707-D9CF-40AE-B4C6-C98DA3205C09}" type="datetimeFigureOut">
               <a:rPr lang="en-US" smtClean="0"/>
               <a:pPr/>
-              <a:t>12/1/25</a:t>
+              <a:t>12/6/25</a:t>
             </a:fld>
             <a:endParaRPr lang="en-US"/>
           </a:p>
@@ -3150,7 +3150,7 @@
             <a:fld id="{1D8BD707-D9CF-40AE-B4C6-C98DA3205C09}" type="datetimeFigureOut">
               <a:rPr lang="en-US" smtClean="0"/>
               <a:pPr/>
-              <a:t>12/1/25</a:t>
+              <a:t>12/6/25</a:t>
             </a:fld>
             <a:endParaRPr lang="en-US"/>
           </a:p>

</xml_diff>